<commit_message>
minor changes to download private datasets
</commit_message>
<xml_diff>
--- a/paper/infrastructure.pptx
+++ b/paper/infrastructure.pptx
@@ -104,6 +104,11 @@
       </a:defRPr>
     </a:lvl9pPr>
   </p:defaultTextStyle>
+  <p:extLst>
+    <p:ext uri="{EFAFB233-063F-42B5-8137-9DF3F51BA10A}">
+      <p15:sldGuideLst xmlns:p15="http://schemas.microsoft.com/office/powerpoint/2012/main"/>
+    </p:ext>
+  </p:extLst>
 </p:presentation>
 </file>
 
@@ -256,7 +261,7 @@
           <a:p>
             <a:fld id="{7D1B79EE-F468-B944-BAE6-543A925AE508}" type="datetimeFigureOut">
               <a:rPr lang="en-US" smtClean="0"/>
-              <a:t>9/26/24</a:t>
+              <a:t>9/27/24</a:t>
             </a:fld>
             <a:endParaRPr lang="en-US"/>
           </a:p>
@@ -456,7 +461,7 @@
           <a:p>
             <a:fld id="{7D1B79EE-F468-B944-BAE6-543A925AE508}" type="datetimeFigureOut">
               <a:rPr lang="en-US" smtClean="0"/>
-              <a:t>9/26/24</a:t>
+              <a:t>9/27/24</a:t>
             </a:fld>
             <a:endParaRPr lang="en-US"/>
           </a:p>
@@ -666,7 +671,7 @@
           <a:p>
             <a:fld id="{7D1B79EE-F468-B944-BAE6-543A925AE508}" type="datetimeFigureOut">
               <a:rPr lang="en-US" smtClean="0"/>
-              <a:t>9/26/24</a:t>
+              <a:t>9/27/24</a:t>
             </a:fld>
             <a:endParaRPr lang="en-US"/>
           </a:p>
@@ -866,7 +871,7 @@
           <a:p>
             <a:fld id="{7D1B79EE-F468-B944-BAE6-543A925AE508}" type="datetimeFigureOut">
               <a:rPr lang="en-US" smtClean="0"/>
-              <a:t>9/26/24</a:t>
+              <a:t>9/27/24</a:t>
             </a:fld>
             <a:endParaRPr lang="en-US"/>
           </a:p>
@@ -1142,7 +1147,7 @@
           <a:p>
             <a:fld id="{7D1B79EE-F468-B944-BAE6-543A925AE508}" type="datetimeFigureOut">
               <a:rPr lang="en-US" smtClean="0"/>
-              <a:t>9/26/24</a:t>
+              <a:t>9/27/24</a:t>
             </a:fld>
             <a:endParaRPr lang="en-US"/>
           </a:p>
@@ -1410,7 +1415,7 @@
           <a:p>
             <a:fld id="{7D1B79EE-F468-B944-BAE6-543A925AE508}" type="datetimeFigureOut">
               <a:rPr lang="en-US" smtClean="0"/>
-              <a:t>9/26/24</a:t>
+              <a:t>9/27/24</a:t>
             </a:fld>
             <a:endParaRPr lang="en-US"/>
           </a:p>
@@ -1825,7 +1830,7 @@
           <a:p>
             <a:fld id="{7D1B79EE-F468-B944-BAE6-543A925AE508}" type="datetimeFigureOut">
               <a:rPr lang="en-US" smtClean="0"/>
-              <a:t>9/26/24</a:t>
+              <a:t>9/27/24</a:t>
             </a:fld>
             <a:endParaRPr lang="en-US"/>
           </a:p>
@@ -1967,7 +1972,7 @@
           <a:p>
             <a:fld id="{7D1B79EE-F468-B944-BAE6-543A925AE508}" type="datetimeFigureOut">
               <a:rPr lang="en-US" smtClean="0"/>
-              <a:t>9/26/24</a:t>
+              <a:t>9/27/24</a:t>
             </a:fld>
             <a:endParaRPr lang="en-US"/>
           </a:p>
@@ -2080,7 +2085,7 @@
           <a:p>
             <a:fld id="{7D1B79EE-F468-B944-BAE6-543A925AE508}" type="datetimeFigureOut">
               <a:rPr lang="en-US" smtClean="0"/>
-              <a:t>9/26/24</a:t>
+              <a:t>9/27/24</a:t>
             </a:fld>
             <a:endParaRPr lang="en-US"/>
           </a:p>
@@ -2393,7 +2398,7 @@
           <a:p>
             <a:fld id="{7D1B79EE-F468-B944-BAE6-543A925AE508}" type="datetimeFigureOut">
               <a:rPr lang="en-US" smtClean="0"/>
-              <a:t>9/26/24</a:t>
+              <a:t>9/27/24</a:t>
             </a:fld>
             <a:endParaRPr lang="en-US"/>
           </a:p>
@@ -2682,7 +2687,7 @@
           <a:p>
             <a:fld id="{7D1B79EE-F468-B944-BAE6-543A925AE508}" type="datetimeFigureOut">
               <a:rPr lang="en-US" smtClean="0"/>
-              <a:t>9/26/24</a:t>
+              <a:t>9/27/24</a:t>
             </a:fld>
             <a:endParaRPr lang="en-US"/>
           </a:p>
@@ -2925,7 +2930,7 @@
           <a:p>
             <a:fld id="{7D1B79EE-F468-B944-BAE6-543A925AE508}" type="datetimeFigureOut">
               <a:rPr lang="en-US" smtClean="0"/>
-              <a:t>9/26/24</a:t>
+              <a:t>9/27/24</a:t>
             </a:fld>
             <a:endParaRPr lang="en-US"/>
           </a:p>
@@ -3344,10 +3349,10 @@
       </p:grpSpPr>
       <p:grpSp>
         <p:nvGrpSpPr>
-          <p:cNvPr id="55" name="Group 54">
-            <a:extLst>
-              <a:ext uri="{FF2B5EF4-FFF2-40B4-BE49-F238E27FC236}">
-                <a16:creationId xmlns:a16="http://schemas.microsoft.com/office/drawing/2014/main" id="{05CD54D3-A5F2-EDCC-2EAF-59731CA69298}"/>
+          <p:cNvPr id="11" name="Group 10">
+            <a:extLst>
+              <a:ext uri="{FF2B5EF4-FFF2-40B4-BE49-F238E27FC236}">
+                <a16:creationId xmlns:a16="http://schemas.microsoft.com/office/drawing/2014/main" id="{43CE20B5-2198-6D4B-111B-99638FDDE616}"/>
               </a:ext>
             </a:extLst>
           </p:cNvPr>
@@ -3356,10 +3361,10 @@
         </p:nvGrpSpPr>
         <p:grpSpPr>
           <a:xfrm>
-            <a:off x="4540076" y="618007"/>
-            <a:ext cx="4246484" cy="2854310"/>
-            <a:chOff x="4540076" y="618007"/>
-            <a:chExt cx="4246484" cy="2854310"/>
+            <a:off x="4027270" y="1535271"/>
+            <a:ext cx="4246484" cy="3067689"/>
+            <a:chOff x="4027270" y="1535271"/>
+            <a:chExt cx="4246484" cy="3067689"/>
           </a:xfrm>
         </p:grpSpPr>
         <p:grpSp>
@@ -3376,7 +3381,7 @@
           </p:nvGrpSpPr>
           <p:grpSpPr>
             <a:xfrm>
-              <a:off x="4540076" y="2469143"/>
+              <a:off x="4027270" y="3599786"/>
               <a:ext cx="2673051" cy="449304"/>
               <a:chOff x="5348365" y="2346627"/>
               <a:chExt cx="2673051" cy="449304"/>
@@ -3485,7 +3490,7 @@
           </p:nvGrpSpPr>
           <p:grpSpPr>
             <a:xfrm>
-              <a:off x="4556750" y="618007"/>
+              <a:off x="4043944" y="1748650"/>
               <a:ext cx="1083102" cy="1197639"/>
               <a:chOff x="4556750" y="618007"/>
               <a:chExt cx="1083102" cy="1197639"/>
@@ -3704,7 +3709,7 @@
           </p:nvSpPr>
           <p:spPr>
             <a:xfrm>
-              <a:off x="4556750" y="1932043"/>
+              <a:off x="4043944" y="3062686"/>
               <a:ext cx="772603" cy="155311"/>
             </a:xfrm>
             <a:prstGeom prst="rect">
@@ -3766,7 +3771,7 @@
           </p:nvSpPr>
           <p:spPr>
             <a:xfrm>
-              <a:off x="6428120" y="1261026"/>
+              <a:off x="5672214" y="2372153"/>
               <a:ext cx="311108" cy="353702"/>
             </a:xfrm>
             <a:prstGeom prst="flowChartMultidocument">
@@ -3823,8 +3828,8 @@
           </p:nvSpPr>
           <p:spPr>
             <a:xfrm>
-              <a:off x="6117016" y="618007"/>
-              <a:ext cx="2131498" cy="1191873"/>
+              <a:off x="6284670" y="1748650"/>
+              <a:ext cx="1451038" cy="1191873"/>
             </a:xfrm>
             <a:prstGeom prst="rect">
               <a:avLst/>
@@ -3873,7 +3878,7 @@
           </p:nvSpPr>
           <p:spPr>
             <a:xfrm>
-              <a:off x="6854842" y="1634026"/>
+              <a:off x="6342036" y="2764669"/>
               <a:ext cx="1451038" cy="200055"/>
             </a:xfrm>
             <a:prstGeom prst="rect">
@@ -3908,7 +3913,7 @@
           </p:nvSpPr>
           <p:spPr>
             <a:xfrm>
-              <a:off x="6421810" y="743577"/>
+              <a:off x="5677917" y="1879978"/>
               <a:ext cx="311108" cy="353702"/>
             </a:xfrm>
             <a:prstGeom prst="flowChartMultidocument">
@@ -3965,7 +3970,7 @@
           </p:nvSpPr>
           <p:spPr>
             <a:xfrm>
-              <a:off x="7077658" y="743577"/>
+              <a:off x="6564852" y="1874220"/>
               <a:ext cx="311108" cy="353702"/>
             </a:xfrm>
             <a:prstGeom prst="flowChartMultidocument">
@@ -4022,7 +4027,7 @@
           </p:nvSpPr>
           <p:spPr>
             <a:xfrm>
-              <a:off x="7077658" y="1248758"/>
+              <a:off x="6564852" y="2379401"/>
               <a:ext cx="311108" cy="353702"/>
             </a:xfrm>
             <a:prstGeom prst="flowChartMultidocument">
@@ -4079,7 +4084,7 @@
           </p:nvSpPr>
           <p:spPr>
             <a:xfrm>
-              <a:off x="7727196" y="743577"/>
+              <a:off x="7214390" y="1874220"/>
               <a:ext cx="311108" cy="353702"/>
             </a:xfrm>
             <a:prstGeom prst="flowChartMultidocument">
@@ -4136,7 +4141,7 @@
           </p:nvSpPr>
           <p:spPr>
             <a:xfrm>
-              <a:off x="7727196" y="1248758"/>
+              <a:off x="7214390" y="2379401"/>
               <a:ext cx="311108" cy="353702"/>
             </a:xfrm>
             <a:prstGeom prst="flowChartMultidocument">
@@ -4193,8 +4198,8 @@
           </p:nvSpPr>
           <p:spPr>
             <a:xfrm>
-              <a:off x="6091786" y="1932043"/>
-              <a:ext cx="485578" cy="155311"/>
+              <a:off x="5778582" y="3067075"/>
+              <a:ext cx="786270" cy="155311"/>
             </a:xfrm>
             <a:prstGeom prst="rect">
               <a:avLst/>
@@ -4248,7 +4253,7 @@
           </p:nvSpPr>
           <p:spPr>
             <a:xfrm>
-              <a:off x="7233212" y="1944655"/>
+              <a:off x="6720406" y="3075298"/>
               <a:ext cx="222816" cy="155311"/>
             </a:xfrm>
             <a:prstGeom prst="rect">
@@ -4303,7 +4308,7 @@
           </p:nvSpPr>
           <p:spPr>
             <a:xfrm>
-              <a:off x="7500980" y="1938349"/>
+              <a:off x="6988174" y="3068992"/>
               <a:ext cx="306896" cy="155311"/>
             </a:xfrm>
             <a:prstGeom prst="rect">
@@ -4358,7 +4363,7 @@
           </p:nvSpPr>
           <p:spPr>
             <a:xfrm>
-              <a:off x="7846402" y="1938349"/>
+              <a:off x="7333596" y="3068992"/>
               <a:ext cx="402112" cy="155311"/>
             </a:xfrm>
             <a:prstGeom prst="rect">
@@ -4416,7 +4421,7 @@
           </p:nvCxnSpPr>
           <p:spPr>
             <a:xfrm>
-              <a:off x="5171090" y="2163029"/>
+              <a:off x="4658284" y="3293672"/>
               <a:ext cx="859662" cy="306114"/>
             </a:xfrm>
             <a:prstGeom prst="bentConnector2">
@@ -4462,12 +4467,12 @@
           </p:nvCxnSpPr>
           <p:spPr>
             <a:xfrm rot="5400000">
-              <a:off x="5991770" y="2126337"/>
-              <a:ext cx="381789" cy="303823"/>
+              <a:off x="5656132" y="3084201"/>
+              <a:ext cx="377400" cy="653771"/>
             </a:xfrm>
             <a:prstGeom prst="bentConnector3">
               <a:avLst>
-                <a:gd name="adj1" fmla="val 20269"/>
+                <a:gd name="adj1" fmla="val 18895"/>
               </a:avLst>
             </a:prstGeom>
             <a:ln w="6350">
@@ -4510,7 +4515,7 @@
           </p:nvCxnSpPr>
           <p:spPr>
             <a:xfrm>
-              <a:off x="6030752" y="2915419"/>
+              <a:off x="5517946" y="4046062"/>
               <a:ext cx="1573433" cy="110622"/>
             </a:xfrm>
             <a:prstGeom prst="straightConnector1">
@@ -4552,7 +4557,7 @@
           </p:nvSpPr>
           <p:spPr>
             <a:xfrm>
-              <a:off x="6421810" y="3026041"/>
+              <a:off x="5909004" y="4156684"/>
               <a:ext cx="2364750" cy="446276"/>
             </a:xfrm>
             <a:prstGeom prst="rect">
@@ -4574,15 +4579,7 @@
             <a:p>
               <a:r>
                 <a:rPr lang="en-US" sz="900" dirty="0"/>
-                <a:t>https://</a:t>
-              </a:r>
-              <a:r>
-                <a:rPr lang="en-US" sz="900" dirty="0" err="1"/>
-                <a:t>github.com</a:t>
-              </a:r>
-              <a:r>
-                <a:rPr lang="en-US" sz="900" dirty="0"/>
-                <a:t>/PRIDE-Archive/pridepy</a:t>
+                <a:t>https://github.com/PRIDE-Archive/pridepy</a:t>
               </a:r>
             </a:p>
           </p:txBody>
@@ -4604,7 +4601,7 @@
           </p:nvCxnSpPr>
           <p:spPr>
             <a:xfrm>
-              <a:off x="7599847" y="2249199"/>
+              <a:off x="7087041" y="3379842"/>
               <a:ext cx="4338" cy="776842"/>
             </a:xfrm>
             <a:prstGeom prst="straightConnector1">
@@ -4632,6 +4629,161 @@
             </a:fontRef>
           </p:style>
         </p:cxnSp>
+        <p:sp>
+          <p:nvSpPr>
+            <p:cNvPr id="5" name="Rectangle 4">
+              <a:extLst>
+                <a:ext uri="{FF2B5EF4-FFF2-40B4-BE49-F238E27FC236}">
+                  <a16:creationId xmlns:a16="http://schemas.microsoft.com/office/drawing/2014/main" id="{DD253874-DCB4-A899-4B1B-C662486D7BB2}"/>
+                </a:ext>
+              </a:extLst>
+            </p:cNvPr>
+            <p:cNvSpPr/>
+            <p:nvPr/>
+          </p:nvSpPr>
+          <p:spPr>
+            <a:xfrm>
+              <a:off x="5463993" y="1747243"/>
+              <a:ext cx="737952" cy="1191873"/>
+            </a:xfrm>
+            <a:prstGeom prst="rect">
+              <a:avLst/>
+            </a:prstGeom>
+            <a:noFill/>
+            <a:ln>
+              <a:prstDash val="dash"/>
+            </a:ln>
+          </p:spPr>
+          <p:style>
+            <a:lnRef idx="2">
+              <a:schemeClr val="accent1">
+                <a:shade val="15000"/>
+              </a:schemeClr>
+            </a:lnRef>
+            <a:fillRef idx="1">
+              <a:schemeClr val="accent1"/>
+            </a:fillRef>
+            <a:effectRef idx="0">
+              <a:schemeClr val="accent1"/>
+            </a:effectRef>
+            <a:fontRef idx="minor">
+              <a:schemeClr val="lt1"/>
+            </a:fontRef>
+          </p:style>
+          <p:txBody>
+            <a:bodyPr rtlCol="0" anchor="ctr"/>
+            <a:lstStyle/>
+            <a:p>
+              <a:pPr algn="ctr"/>
+              <a:endParaRPr lang="en-US"/>
+            </a:p>
+          </p:txBody>
+        </p:sp>
+        <p:sp>
+          <p:nvSpPr>
+            <p:cNvPr id="6" name="TextBox 5">
+              <a:extLst>
+                <a:ext uri="{FF2B5EF4-FFF2-40B4-BE49-F238E27FC236}">
+                  <a16:creationId xmlns:a16="http://schemas.microsoft.com/office/drawing/2014/main" id="{6F2EC4AC-68D8-0C43-42CE-05AF59D00E8A}"/>
+                </a:ext>
+              </a:extLst>
+            </p:cNvPr>
+            <p:cNvSpPr txBox="1"/>
+            <p:nvPr/>
+          </p:nvSpPr>
+          <p:spPr>
+            <a:xfrm>
+              <a:off x="6800640" y="1535271"/>
+              <a:ext cx="463588" cy="215444"/>
+            </a:xfrm>
+            <a:prstGeom prst="rect">
+              <a:avLst/>
+            </a:prstGeom>
+            <a:noFill/>
+          </p:spPr>
+          <p:txBody>
+            <a:bodyPr wrap="none" rtlCol="0">
+              <a:spAutoFit/>
+            </a:bodyPr>
+            <a:lstStyle/>
+            <a:p>
+              <a:r>
+                <a:rPr lang="en-US" sz="800" dirty="0"/>
+                <a:t>public</a:t>
+              </a:r>
+            </a:p>
+          </p:txBody>
+        </p:sp>
+        <p:sp>
+          <p:nvSpPr>
+            <p:cNvPr id="7" name="TextBox 6">
+              <a:extLst>
+                <a:ext uri="{FF2B5EF4-FFF2-40B4-BE49-F238E27FC236}">
+                  <a16:creationId xmlns:a16="http://schemas.microsoft.com/office/drawing/2014/main" id="{38EC78EF-C79B-5D71-CFB4-95FB0282BD8D}"/>
+                </a:ext>
+              </a:extLst>
+            </p:cNvPr>
+            <p:cNvSpPr txBox="1"/>
+            <p:nvPr/>
+          </p:nvSpPr>
+          <p:spPr>
+            <a:xfrm>
+              <a:off x="5689518" y="1535271"/>
+              <a:ext cx="489236" cy="215444"/>
+            </a:xfrm>
+            <a:prstGeom prst="rect">
+              <a:avLst/>
+            </a:prstGeom>
+            <a:noFill/>
+          </p:spPr>
+          <p:txBody>
+            <a:bodyPr wrap="none" rtlCol="0">
+              <a:spAutoFit/>
+            </a:bodyPr>
+            <a:lstStyle/>
+            <a:p>
+              <a:r>
+                <a:rPr lang="en-US" sz="800" dirty="0"/>
+                <a:t>private</a:t>
+              </a:r>
+            </a:p>
+          </p:txBody>
+        </p:sp>
+        <p:sp>
+          <p:nvSpPr>
+            <p:cNvPr id="9" name="TextBox 8">
+              <a:extLst>
+                <a:ext uri="{FF2B5EF4-FFF2-40B4-BE49-F238E27FC236}">
+                  <a16:creationId xmlns:a16="http://schemas.microsoft.com/office/drawing/2014/main" id="{16633B8A-350A-6E3F-D2EB-00EDB3E076C8}"/>
+                </a:ext>
+              </a:extLst>
+            </p:cNvPr>
+            <p:cNvSpPr txBox="1"/>
+            <p:nvPr/>
+          </p:nvSpPr>
+          <p:spPr>
+            <a:xfrm>
+              <a:off x="5433093" y="2760507"/>
+              <a:ext cx="812232" cy="200055"/>
+            </a:xfrm>
+            <a:prstGeom prst="rect">
+              <a:avLst/>
+            </a:prstGeom>
+            <a:noFill/>
+          </p:spPr>
+          <p:txBody>
+            <a:bodyPr wrap="square" rtlCol="0">
+              <a:spAutoFit/>
+            </a:bodyPr>
+            <a:lstStyle/>
+            <a:p>
+              <a:r>
+                <a:rPr lang="en-US" sz="700" dirty="0"/>
+                <a:t>NFS file-system</a:t>
+              </a:r>
+            </a:p>
+          </p:txBody>
+        </p:sp>
       </p:grpSp>
     </p:spTree>
     <p:extLst>

</xml_diff>

<commit_message>
remove s3 from docs.
</commit_message>
<xml_diff>
--- a/paper/infrastructure.pptx
+++ b/paper/infrastructure.pptx
@@ -261,7 +261,7 @@
           <a:p>
             <a:fld id="{7D1B79EE-F468-B944-BAE6-543A925AE508}" type="datetimeFigureOut">
               <a:rPr lang="en-US" smtClean="0"/>
-              <a:t>9/27/24</a:t>
+              <a:t>9/30/24</a:t>
             </a:fld>
             <a:endParaRPr lang="en-US"/>
           </a:p>
@@ -461,7 +461,7 @@
           <a:p>
             <a:fld id="{7D1B79EE-F468-B944-BAE6-543A925AE508}" type="datetimeFigureOut">
               <a:rPr lang="en-US" smtClean="0"/>
-              <a:t>9/27/24</a:t>
+              <a:t>9/30/24</a:t>
             </a:fld>
             <a:endParaRPr lang="en-US"/>
           </a:p>
@@ -671,7 +671,7 @@
           <a:p>
             <a:fld id="{7D1B79EE-F468-B944-BAE6-543A925AE508}" type="datetimeFigureOut">
               <a:rPr lang="en-US" smtClean="0"/>
-              <a:t>9/27/24</a:t>
+              <a:t>9/30/24</a:t>
             </a:fld>
             <a:endParaRPr lang="en-US"/>
           </a:p>
@@ -871,7 +871,7 @@
           <a:p>
             <a:fld id="{7D1B79EE-F468-B944-BAE6-543A925AE508}" type="datetimeFigureOut">
               <a:rPr lang="en-US" smtClean="0"/>
-              <a:t>9/27/24</a:t>
+              <a:t>9/30/24</a:t>
             </a:fld>
             <a:endParaRPr lang="en-US"/>
           </a:p>
@@ -1147,7 +1147,7 @@
           <a:p>
             <a:fld id="{7D1B79EE-F468-B944-BAE6-543A925AE508}" type="datetimeFigureOut">
               <a:rPr lang="en-US" smtClean="0"/>
-              <a:t>9/27/24</a:t>
+              <a:t>9/30/24</a:t>
             </a:fld>
             <a:endParaRPr lang="en-US"/>
           </a:p>
@@ -1415,7 +1415,7 @@
           <a:p>
             <a:fld id="{7D1B79EE-F468-B944-BAE6-543A925AE508}" type="datetimeFigureOut">
               <a:rPr lang="en-US" smtClean="0"/>
-              <a:t>9/27/24</a:t>
+              <a:t>9/30/24</a:t>
             </a:fld>
             <a:endParaRPr lang="en-US"/>
           </a:p>
@@ -1830,7 +1830,7 @@
           <a:p>
             <a:fld id="{7D1B79EE-F468-B944-BAE6-543A925AE508}" type="datetimeFigureOut">
               <a:rPr lang="en-US" smtClean="0"/>
-              <a:t>9/27/24</a:t>
+              <a:t>9/30/24</a:t>
             </a:fld>
             <a:endParaRPr lang="en-US"/>
           </a:p>
@@ -1972,7 +1972,7 @@
           <a:p>
             <a:fld id="{7D1B79EE-F468-B944-BAE6-543A925AE508}" type="datetimeFigureOut">
               <a:rPr lang="en-US" smtClean="0"/>
-              <a:t>9/27/24</a:t>
+              <a:t>9/30/24</a:t>
             </a:fld>
             <a:endParaRPr lang="en-US"/>
           </a:p>
@@ -2085,7 +2085,7 @@
           <a:p>
             <a:fld id="{7D1B79EE-F468-B944-BAE6-543A925AE508}" type="datetimeFigureOut">
               <a:rPr lang="en-US" smtClean="0"/>
-              <a:t>9/27/24</a:t>
+              <a:t>9/30/24</a:t>
             </a:fld>
             <a:endParaRPr lang="en-US"/>
           </a:p>
@@ -2398,7 +2398,7 @@
           <a:p>
             <a:fld id="{7D1B79EE-F468-B944-BAE6-543A925AE508}" type="datetimeFigureOut">
               <a:rPr lang="en-US" smtClean="0"/>
-              <a:t>9/27/24</a:t>
+              <a:t>9/30/24</a:t>
             </a:fld>
             <a:endParaRPr lang="en-US"/>
           </a:p>
@@ -2687,7 +2687,7 @@
           <a:p>
             <a:fld id="{7D1B79EE-F468-B944-BAE6-543A925AE508}" type="datetimeFigureOut">
               <a:rPr lang="en-US" smtClean="0"/>
-              <a:t>9/27/24</a:t>
+              <a:t>9/30/24</a:t>
             </a:fld>
             <a:endParaRPr lang="en-US"/>
           </a:p>
@@ -2930,7 +2930,7 @@
           <a:p>
             <a:fld id="{7D1B79EE-F468-B944-BAE6-543A925AE508}" type="datetimeFigureOut">
               <a:rPr lang="en-US" smtClean="0"/>
-              <a:t>9/27/24</a:t>
+              <a:t>9/30/24</a:t>
             </a:fld>
             <a:endParaRPr lang="en-US"/>
           </a:p>
@@ -4198,8 +4198,8 @@
           </p:nvSpPr>
           <p:spPr>
             <a:xfrm>
-              <a:off x="5778582" y="3067075"/>
-              <a:ext cx="786270" cy="155311"/>
+              <a:off x="5459055" y="3038002"/>
+              <a:ext cx="742890" cy="155311"/>
             </a:xfrm>
             <a:prstGeom prst="rect">
               <a:avLst/>
@@ -4234,7 +4234,7 @@
                     <a:schemeClr val="tx1"/>
                   </a:solidFill>
                 </a:rPr>
-                <a:t>S3 stream</a:t>
+                <a:t>PRIDE stream API</a:t>
               </a:r>
             </a:p>
           </p:txBody>
@@ -4253,7 +4253,7 @@
           </p:nvSpPr>
           <p:spPr>
             <a:xfrm>
-              <a:off x="6720406" y="3075298"/>
+              <a:off x="6311975" y="3040514"/>
               <a:ext cx="222816" cy="155311"/>
             </a:xfrm>
             <a:prstGeom prst="rect">
@@ -4308,7 +4308,7 @@
           </p:nvSpPr>
           <p:spPr>
             <a:xfrm>
-              <a:off x="6988174" y="3068992"/>
+              <a:off x="6718537" y="3037188"/>
               <a:ext cx="306896" cy="155311"/>
             </a:xfrm>
             <a:prstGeom prst="rect">
@@ -4363,7 +4363,7 @@
           </p:nvSpPr>
           <p:spPr>
             <a:xfrm>
-              <a:off x="7333596" y="3068992"/>
+              <a:off x="7209179" y="3033520"/>
               <a:ext cx="402112" cy="155311"/>
             </a:xfrm>
             <a:prstGeom prst="rect">
@@ -4467,12 +4467,12 @@
           </p:nvCxnSpPr>
           <p:spPr>
             <a:xfrm rot="5400000">
-              <a:off x="5656132" y="3084201"/>
-              <a:ext cx="377400" cy="653771"/>
+              <a:off x="5470987" y="3240272"/>
+              <a:ext cx="406473" cy="312554"/>
             </a:xfrm>
             <a:prstGeom prst="bentConnector3">
               <a:avLst>
-                <a:gd name="adj1" fmla="val 18895"/>
+                <a:gd name="adj1" fmla="val 24714"/>
               </a:avLst>
             </a:prstGeom>
             <a:ln w="6350">
@@ -4601,8 +4601,8 @@
           </p:nvCxnSpPr>
           <p:spPr>
             <a:xfrm>
-              <a:off x="7087041" y="3379842"/>
-              <a:ext cx="4338" cy="776842"/>
+              <a:off x="7091379" y="3260651"/>
+              <a:ext cx="0" cy="896033"/>
             </a:xfrm>
             <a:prstGeom prst="straightConnector1">
               <a:avLst/>

</xml_diff>